<commit_message>
Last commit before Presenation
</commit_message>
<xml_diff>
--- a/public/is219presentation.pptx
+++ b/public/is219presentation.pptx
@@ -6,10 +6,19 @@
   </p:sldMasterIdLst>
   <p:sldIdLst>
     <p:sldId id="256" r:id="rId2"/>
-    <p:sldId id="257" r:id="rId3"/>
-    <p:sldId id="258" r:id="rId4"/>
-    <p:sldId id="259" r:id="rId5"/>
-    <p:sldId id="260" r:id="rId6"/>
+    <p:sldId id="267" r:id="rId3"/>
+    <p:sldId id="268" r:id="rId4"/>
+    <p:sldId id="269" r:id="rId5"/>
+    <p:sldId id="270" r:id="rId6"/>
+    <p:sldId id="273" r:id="rId7"/>
+    <p:sldId id="271" r:id="rId8"/>
+    <p:sldId id="272" r:id="rId9"/>
+    <p:sldId id="266" r:id="rId10"/>
+    <p:sldId id="265" r:id="rId11"/>
+    <p:sldId id="264" r:id="rId12"/>
+    <p:sldId id="262" r:id="rId13"/>
+    <p:sldId id="263" r:id="rId14"/>
+    <p:sldId id="261" r:id="rId15"/>
   </p:sldIdLst>
   <p:sldSz cx="9144000" cy="6858000" type="screen4x3"/>
   <p:notesSz cx="6858000" cy="9144000"/>
@@ -299,7 +308,7 @@
           <a:p>
             <a:fld id="{C8A432C8-69A7-458B-9684-2BFA64B31948}" type="datetime2">
               <a:rPr lang="en-US" smtClean="0"/>
-              <a:t>Monday, 11 May 15</a:t>
+              <a:t>Wednesday, 13 May 15</a:t>
             </a:fld>
             <a:endParaRPr lang="en-US"/>
           </a:p>
@@ -501,7 +510,7 @@
           <a:p>
             <a:fld id="{8CC057FC-95B6-4D89-AFDA-ABA33EE921E5}" type="datetime2">
               <a:rPr lang="en-US" smtClean="0"/>
-              <a:t>Monday, 11 May 15</a:t>
+              <a:t>Wednesday, 13 May 15</a:t>
             </a:fld>
             <a:endParaRPr lang="en-US"/>
           </a:p>
@@ -678,7 +687,7 @@
           <a:p>
             <a:fld id="{EC4549AC-EB31-477F-92A9-B1988E232878}" type="datetime2">
               <a:rPr lang="en-US" smtClean="0"/>
-              <a:t>Monday, 11 May 15</a:t>
+              <a:t>Wednesday, 13 May 15</a:t>
             </a:fld>
             <a:endParaRPr lang="en-US"/>
           </a:p>
@@ -845,7 +854,7 @@
           <a:p>
             <a:fld id="{6396A3A3-94A6-4E5B-AF39-173ACA3E61CC}" type="datetime2">
               <a:rPr lang="en-US" smtClean="0"/>
-              <a:t>Monday, 11 May 15</a:t>
+              <a:t>Wednesday, 13 May 15</a:t>
             </a:fld>
             <a:endParaRPr lang="en-US"/>
           </a:p>
@@ -1095,7 +1104,7 @@
           <a:p>
             <a:fld id="{9933D019-A32C-4EAD-B8E6-DBDA699692FD}" type="datetime2">
               <a:rPr lang="en-US" smtClean="0"/>
-              <a:t>Monday, 11 May 15</a:t>
+              <a:t>Wednesday, 13 May 15</a:t>
             </a:fld>
             <a:endParaRPr lang="en-US"/>
           </a:p>
@@ -1415,7 +1424,7 @@
           <a:p>
             <a:fld id="{CCEBA98F-560C-4997-81C4-81D4D9187EAB}" type="datetime2">
               <a:rPr lang="en-US" smtClean="0"/>
-              <a:t>Monday, 11 May 15</a:t>
+              <a:t>Wednesday, 13 May 15</a:t>
             </a:fld>
             <a:endParaRPr lang="en-US"/>
           </a:p>
@@ -1883,7 +1892,7 @@
           <a:p>
             <a:fld id="{150972B2-CA5C-437D-87D0-8081271A9E4B}" type="datetime2">
               <a:rPr lang="en-US" smtClean="0"/>
-              <a:t>Monday, 11 May 15</a:t>
+              <a:t>Wednesday, 13 May 15</a:t>
             </a:fld>
             <a:endParaRPr lang="en-US"/>
           </a:p>
@@ -2033,7 +2042,7 @@
           <a:p>
             <a:fld id="{79CD4847-11EF-4466-A8AD-85CDB7B49118}" type="datetime2">
               <a:rPr lang="en-US" smtClean="0"/>
-              <a:t>Monday, 11 May 15</a:t>
+              <a:t>Wednesday, 13 May 15</a:t>
             </a:fld>
             <a:endParaRPr lang="en-US"/>
           </a:p>
@@ -2125,7 +2134,7 @@
           <a:p>
             <a:fld id="{F168457A-3AB9-4880-8A0C-9F8524491207}" type="datetime2">
               <a:rPr lang="en-US" smtClean="0"/>
-              <a:t>Monday, 11 May 15</a:t>
+              <a:t>Wednesday, 13 May 15</a:t>
             </a:fld>
             <a:endParaRPr lang="en-US"/>
           </a:p>
@@ -2401,7 +2410,7 @@
           <a:p>
             <a:fld id="{3FE976D3-5B7F-4300-ABED-C91F1B2AE209}" type="datetime2">
               <a:rPr lang="en-US" smtClean="0"/>
-              <a:t>Monday, 11 May 15</a:t>
+              <a:t>Wednesday, 13 May 15</a:t>
             </a:fld>
             <a:endParaRPr lang="en-US"/>
           </a:p>
@@ -2708,7 +2717,7 @@
           <a:p>
             <a:fld id="{EBDC1E59-17DD-41CE-97CA-624A472382D4}" type="datetime2">
               <a:rPr lang="en-US" smtClean="0"/>
-              <a:t>Monday, 11 May 15</a:t>
+              <a:t>Wednesday, 13 May 15</a:t>
             </a:fld>
             <a:endParaRPr lang="en-US"/>
           </a:p>
@@ -3008,7 +3017,7 @@
           <a:p>
             <a:fld id="{A80CB818-7379-467D-8E76-EF9D9074A26C}" type="datetime2">
               <a:rPr lang="en-US" smtClean="0"/>
-              <a:t>Monday, 11 May 15</a:t>
+              <a:t>Wednesday, 13 May 15</a:t>
             </a:fld>
             <a:endParaRPr lang="en-US" dirty="0"/>
           </a:p>
@@ -3479,6 +3488,674 @@
 </p:sld>
 </file>
 
+<file path=ppt/slides/slide10.xml><?xml version="1.0" encoding="utf-8"?>
+<p:sld xmlns:a="http://schemas.openxmlformats.org/drawingml/2006/main" xmlns:r="http://schemas.openxmlformats.org/officeDocument/2006/relationships" xmlns:p="http://schemas.openxmlformats.org/presentationml/2006/main">
+  <p:cSld>
+    <p:spTree>
+      <p:nvGrpSpPr>
+        <p:cNvPr id="1" name=""/>
+        <p:cNvGrpSpPr/>
+        <p:nvPr/>
+      </p:nvGrpSpPr>
+      <p:grpSpPr>
+        <a:xfrm>
+          <a:off x="0" y="0"/>
+          <a:ext cx="0" cy="0"/>
+          <a:chOff x="0" y="0"/>
+          <a:chExt cx="0" cy="0"/>
+        </a:xfrm>
+      </p:grpSpPr>
+      <p:sp>
+        <p:nvSpPr>
+          <p:cNvPr id="2" name="Title 1"/>
+          <p:cNvSpPr>
+            <a:spLocks noGrp="1"/>
+          </p:cNvSpPr>
+          <p:nvPr>
+            <p:ph type="title"/>
+          </p:nvPr>
+        </p:nvSpPr>
+        <p:spPr/>
+        <p:txBody>
+          <a:bodyPr/>
+          <a:lstStyle/>
+          <a:p>
+            <a:r>
+              <a:rPr lang="en-US" dirty="0" err="1" smtClean="0"/>
+              <a:t>Github</a:t>
+            </a:r>
+            <a:endParaRPr lang="en-US" dirty="0"/>
+          </a:p>
+        </p:txBody>
+      </p:sp>
+      <p:pic>
+        <p:nvPicPr>
+          <p:cNvPr id="5" name="Content Placeholder 4"/>
+          <p:cNvPicPr>
+            <a:picLocks noGrp="1" noChangeAspect="1"/>
+          </p:cNvPicPr>
+          <p:nvPr>
+            <p:ph idx="1"/>
+          </p:nvPr>
+        </p:nvPicPr>
+        <p:blipFill>
+          <a:blip r:embed="rId2">
+            <a:extLst>
+              <a:ext uri="{28A0092B-C50C-407E-A947-70E740481C1C}">
+                <a14:useLocalDpi xmlns:a14="http://schemas.microsoft.com/office/drawing/2010/main" val="0"/>
+              </a:ext>
+            </a:extLst>
+          </a:blip>
+          <a:stretch>
+            <a:fillRect/>
+          </a:stretch>
+        </p:blipFill>
+        <p:spPr>
+          <a:xfrm>
+            <a:off x="2971800" y="1028591"/>
+            <a:ext cx="5715000" cy="5104818"/>
+          </a:xfrm>
+        </p:spPr>
+      </p:pic>
+      <p:sp>
+        <p:nvSpPr>
+          <p:cNvPr id="4" name="Text Placeholder 3"/>
+          <p:cNvSpPr>
+            <a:spLocks noGrp="1"/>
+          </p:cNvSpPr>
+          <p:nvPr>
+            <p:ph type="body" sz="half" idx="2"/>
+          </p:nvPr>
+        </p:nvSpPr>
+        <p:spPr/>
+        <p:txBody>
+          <a:bodyPr/>
+          <a:lstStyle/>
+          <a:p>
+            <a:r>
+              <a:rPr lang="en-US" dirty="0" smtClean="0"/>
+              <a:t>Project Homepage</a:t>
+            </a:r>
+            <a:endParaRPr lang="en-US" dirty="0"/>
+          </a:p>
+        </p:txBody>
+      </p:sp>
+    </p:spTree>
+    <p:extLst>
+      <p:ext uri="{BB962C8B-B14F-4D97-AF65-F5344CB8AC3E}">
+        <p14:creationId xmlns:p14="http://schemas.microsoft.com/office/powerpoint/2010/main" val="2544041744"/>
+      </p:ext>
+    </p:extLst>
+  </p:cSld>
+  <p:clrMapOvr>
+    <a:masterClrMapping/>
+  </p:clrMapOvr>
+</p:sld>
+</file>
+
+<file path=ppt/slides/slide11.xml><?xml version="1.0" encoding="utf-8"?>
+<p:sld xmlns:a="http://schemas.openxmlformats.org/drawingml/2006/main" xmlns:r="http://schemas.openxmlformats.org/officeDocument/2006/relationships" xmlns:p="http://schemas.openxmlformats.org/presentationml/2006/main">
+  <p:cSld>
+    <p:spTree>
+      <p:nvGrpSpPr>
+        <p:cNvPr id="1" name=""/>
+        <p:cNvGrpSpPr/>
+        <p:nvPr/>
+      </p:nvGrpSpPr>
+      <p:grpSpPr>
+        <a:xfrm>
+          <a:off x="0" y="0"/>
+          <a:ext cx="0" cy="0"/>
+          <a:chOff x="0" y="0"/>
+          <a:chExt cx="0" cy="0"/>
+        </a:xfrm>
+      </p:grpSpPr>
+      <p:sp>
+        <p:nvSpPr>
+          <p:cNvPr id="2" name="Title 1"/>
+          <p:cNvSpPr>
+            <a:spLocks noGrp="1"/>
+          </p:cNvSpPr>
+          <p:nvPr>
+            <p:ph type="title"/>
+          </p:nvPr>
+        </p:nvSpPr>
+        <p:spPr/>
+        <p:txBody>
+          <a:bodyPr/>
+          <a:lstStyle/>
+          <a:p>
+            <a:r>
+              <a:rPr lang="en-US" dirty="0" smtClean="0"/>
+              <a:t>Code Academy</a:t>
+            </a:r>
+            <a:endParaRPr lang="en-US" dirty="0"/>
+          </a:p>
+        </p:txBody>
+      </p:sp>
+      <p:pic>
+        <p:nvPicPr>
+          <p:cNvPr id="5" name="Content Placeholder 4" descr="Screen Shot 2015-05-13 at 06.29.16.png"/>
+          <p:cNvPicPr>
+            <a:picLocks noGrp="1" noChangeAspect="1"/>
+          </p:cNvPicPr>
+          <p:nvPr>
+            <p:ph idx="1"/>
+          </p:nvPr>
+        </p:nvPicPr>
+        <p:blipFill>
+          <a:blip r:embed="rId2">
+            <a:extLst>
+              <a:ext uri="{28A0092B-C50C-407E-A947-70E740481C1C}">
+                <a14:useLocalDpi xmlns:a14="http://schemas.microsoft.com/office/drawing/2010/main" val="0"/>
+              </a:ext>
+            </a:extLst>
+          </a:blip>
+          <a:srcRect l="-27764" r="-27764"/>
+          <a:stretch>
+            <a:fillRect/>
+          </a:stretch>
+        </p:blipFill>
+        <p:spPr/>
+      </p:pic>
+      <p:sp>
+        <p:nvSpPr>
+          <p:cNvPr id="4" name="Text Placeholder 3"/>
+          <p:cNvSpPr>
+            <a:spLocks noGrp="1"/>
+          </p:cNvSpPr>
+          <p:nvPr>
+            <p:ph type="body" sz="half" idx="2"/>
+          </p:nvPr>
+        </p:nvSpPr>
+        <p:spPr/>
+        <p:txBody>
+          <a:bodyPr/>
+          <a:lstStyle/>
+          <a:p>
+            <a:r>
+              <a:rPr lang="en-US" dirty="0" smtClean="0"/>
+              <a:t>Badges</a:t>
+            </a:r>
+            <a:endParaRPr lang="en-US" dirty="0"/>
+          </a:p>
+        </p:txBody>
+      </p:sp>
+    </p:spTree>
+    <p:extLst>
+      <p:ext uri="{BB962C8B-B14F-4D97-AF65-F5344CB8AC3E}">
+        <p14:creationId xmlns:p14="http://schemas.microsoft.com/office/powerpoint/2010/main" val="3303945332"/>
+      </p:ext>
+    </p:extLst>
+  </p:cSld>
+  <p:clrMapOvr>
+    <a:masterClrMapping/>
+  </p:clrMapOvr>
+</p:sld>
+</file>
+
+<file path=ppt/slides/slide12.xml><?xml version="1.0" encoding="utf-8"?>
+<p:sld xmlns:a="http://schemas.openxmlformats.org/drawingml/2006/main" xmlns:r="http://schemas.openxmlformats.org/officeDocument/2006/relationships" xmlns:p="http://schemas.openxmlformats.org/presentationml/2006/main">
+  <p:cSld>
+    <p:spTree>
+      <p:nvGrpSpPr>
+        <p:cNvPr id="1" name=""/>
+        <p:cNvGrpSpPr/>
+        <p:nvPr/>
+      </p:nvGrpSpPr>
+      <p:grpSpPr>
+        <a:xfrm>
+          <a:off x="0" y="0"/>
+          <a:ext cx="0" cy="0"/>
+          <a:chOff x="0" y="0"/>
+          <a:chExt cx="0" cy="0"/>
+        </a:xfrm>
+      </p:grpSpPr>
+      <p:sp>
+        <p:nvSpPr>
+          <p:cNvPr id="2" name="Title 1"/>
+          <p:cNvSpPr>
+            <a:spLocks noGrp="1"/>
+          </p:cNvSpPr>
+          <p:nvPr>
+            <p:ph type="title"/>
+          </p:nvPr>
+        </p:nvSpPr>
+        <p:spPr/>
+        <p:txBody>
+          <a:bodyPr/>
+          <a:lstStyle/>
+          <a:p>
+            <a:r>
+              <a:rPr lang="en-US" dirty="0" smtClean="0"/>
+              <a:t>Unit </a:t>
+            </a:r>
+            <a:r>
+              <a:rPr lang="en-US" dirty="0"/>
+              <a:t>test code and results</a:t>
+            </a:r>
+          </a:p>
+        </p:txBody>
+      </p:sp>
+      <p:sp>
+        <p:nvSpPr>
+          <p:cNvPr id="3" name="Text Placeholder 2"/>
+          <p:cNvSpPr>
+            <a:spLocks noGrp="1"/>
+          </p:cNvSpPr>
+          <p:nvPr>
+            <p:ph type="body" idx="1"/>
+          </p:nvPr>
+        </p:nvSpPr>
+        <p:spPr/>
+        <p:txBody>
+          <a:bodyPr/>
+          <a:lstStyle/>
+          <a:p>
+            <a:r>
+              <a:rPr lang="en-US" dirty="0" smtClean="0"/>
+              <a:t>Mocha Test</a:t>
+            </a:r>
+            <a:endParaRPr lang="en-US" dirty="0"/>
+          </a:p>
+        </p:txBody>
+      </p:sp>
+      <p:pic>
+        <p:nvPicPr>
+          <p:cNvPr id="7" name="Content Placeholder 6" descr="Screen Shot 2015-05-13 at 06.40.42.png"/>
+          <p:cNvPicPr>
+            <a:picLocks noGrp="1" noChangeAspect="1"/>
+          </p:cNvPicPr>
+          <p:nvPr>
+            <p:ph sz="half" idx="2"/>
+          </p:nvPr>
+        </p:nvPicPr>
+        <p:blipFill>
+          <a:blip r:embed="rId2">
+            <a:extLst>
+              <a:ext uri="{28A0092B-C50C-407E-A947-70E740481C1C}">
+                <a14:useLocalDpi xmlns:a14="http://schemas.microsoft.com/office/drawing/2010/main" val="0"/>
+              </a:ext>
+            </a:extLst>
+          </a:blip>
+          <a:srcRect t="715" b="715"/>
+          <a:stretch>
+            <a:fillRect/>
+          </a:stretch>
+        </p:blipFill>
+        <p:spPr/>
+      </p:pic>
+      <p:sp>
+        <p:nvSpPr>
+          <p:cNvPr id="5" name="Text Placeholder 4"/>
+          <p:cNvSpPr>
+            <a:spLocks noGrp="1"/>
+          </p:cNvSpPr>
+          <p:nvPr>
+            <p:ph type="body" sz="quarter" idx="3"/>
+          </p:nvPr>
+        </p:nvSpPr>
+        <p:spPr/>
+        <p:txBody>
+          <a:bodyPr/>
+          <a:lstStyle/>
+          <a:p>
+            <a:r>
+              <a:rPr lang="en-US" dirty="0" smtClean="0"/>
+              <a:t>Results</a:t>
+            </a:r>
+            <a:endParaRPr lang="en-US" dirty="0"/>
+          </a:p>
+        </p:txBody>
+      </p:sp>
+      <p:pic>
+        <p:nvPicPr>
+          <p:cNvPr id="8" name="Content Placeholder 7" descr="Screen Shot 2015-05-13 at 06.34.10.png"/>
+          <p:cNvPicPr>
+            <a:picLocks noGrp="1" noChangeAspect="1"/>
+          </p:cNvPicPr>
+          <p:nvPr>
+            <p:ph sz="quarter" idx="4"/>
+          </p:nvPr>
+        </p:nvPicPr>
+        <p:blipFill>
+          <a:blip r:embed="rId3">
+            <a:extLst>
+              <a:ext uri="{28A0092B-C50C-407E-A947-70E740481C1C}">
+                <a14:useLocalDpi xmlns:a14="http://schemas.microsoft.com/office/drawing/2010/main" val="0"/>
+              </a:ext>
+            </a:extLst>
+          </a:blip>
+          <a:srcRect t="-16523" b="-16523"/>
+          <a:stretch>
+            <a:fillRect/>
+          </a:stretch>
+        </p:blipFill>
+        <p:spPr>
+          <a:xfrm>
+            <a:off x="4754880" y="2567436"/>
+            <a:ext cx="3931920" cy="2902023"/>
+          </a:xfrm>
+        </p:spPr>
+      </p:pic>
+    </p:spTree>
+    <p:extLst>
+      <p:ext uri="{BB962C8B-B14F-4D97-AF65-F5344CB8AC3E}">
+        <p14:creationId xmlns:p14="http://schemas.microsoft.com/office/powerpoint/2010/main" val="546106591"/>
+      </p:ext>
+    </p:extLst>
+  </p:cSld>
+  <p:clrMapOvr>
+    <a:masterClrMapping/>
+  </p:clrMapOvr>
+</p:sld>
+</file>
+
+<file path=ppt/slides/slide13.xml><?xml version="1.0" encoding="utf-8"?>
+<p:sld xmlns:a="http://schemas.openxmlformats.org/drawingml/2006/main" xmlns:r="http://schemas.openxmlformats.org/officeDocument/2006/relationships" xmlns:p="http://schemas.openxmlformats.org/presentationml/2006/main">
+  <p:cSld>
+    <p:spTree>
+      <p:nvGrpSpPr>
+        <p:cNvPr id="1" name=""/>
+        <p:cNvGrpSpPr/>
+        <p:nvPr/>
+      </p:nvGrpSpPr>
+      <p:grpSpPr>
+        <a:xfrm>
+          <a:off x="0" y="0"/>
+          <a:ext cx="0" cy="0"/>
+          <a:chOff x="0" y="0"/>
+          <a:chExt cx="0" cy="0"/>
+        </a:xfrm>
+      </p:grpSpPr>
+      <p:sp>
+        <p:nvSpPr>
+          <p:cNvPr id="2" name="Title 1"/>
+          <p:cNvSpPr>
+            <a:spLocks noGrp="1"/>
+          </p:cNvSpPr>
+          <p:nvPr>
+            <p:ph type="title"/>
+          </p:nvPr>
+        </p:nvSpPr>
+        <p:spPr/>
+        <p:txBody>
+          <a:bodyPr/>
+          <a:lstStyle/>
+          <a:p>
+            <a:r>
+              <a:rPr lang="en-US" dirty="0" err="1" smtClean="0"/>
+              <a:t>QUnit</a:t>
+            </a:r>
+            <a:r>
+              <a:rPr lang="en-US" dirty="0" smtClean="0"/>
+              <a:t> </a:t>
+            </a:r>
+            <a:r>
+              <a:rPr lang="en-US" dirty="0"/>
+              <a:t>test code and results</a:t>
+            </a:r>
+          </a:p>
+        </p:txBody>
+      </p:sp>
+      <p:sp>
+        <p:nvSpPr>
+          <p:cNvPr id="3" name="Text Placeholder 2"/>
+          <p:cNvSpPr>
+            <a:spLocks noGrp="1"/>
+          </p:cNvSpPr>
+          <p:nvPr>
+            <p:ph type="body" idx="1"/>
+          </p:nvPr>
+        </p:nvSpPr>
+        <p:spPr/>
+        <p:txBody>
+          <a:bodyPr/>
+          <a:lstStyle/>
+          <a:p>
+            <a:r>
+              <a:rPr lang="en-US" dirty="0" smtClean="0"/>
+              <a:t>Mocha Test</a:t>
+            </a:r>
+            <a:endParaRPr lang="en-US" dirty="0"/>
+          </a:p>
+        </p:txBody>
+      </p:sp>
+      <p:pic>
+        <p:nvPicPr>
+          <p:cNvPr id="7" name="Content Placeholder 6"/>
+          <p:cNvPicPr>
+            <a:picLocks noGrp="1" noChangeAspect="1"/>
+          </p:cNvPicPr>
+          <p:nvPr>
+            <p:ph sz="half" idx="2"/>
+          </p:nvPr>
+        </p:nvPicPr>
+        <p:blipFill>
+          <a:blip r:embed="rId2">
+            <a:extLst>
+              <a:ext uri="{28A0092B-C50C-407E-A947-70E740481C1C}">
+                <a14:useLocalDpi xmlns:a14="http://schemas.microsoft.com/office/drawing/2010/main" val="0"/>
+              </a:ext>
+            </a:extLst>
+          </a:blip>
+          <a:stretch>
+            <a:fillRect/>
+          </a:stretch>
+        </p:blipFill>
+        <p:spPr>
+          <a:xfrm>
+            <a:off x="457200" y="2821779"/>
+            <a:ext cx="3931920" cy="3184530"/>
+          </a:xfrm>
+        </p:spPr>
+      </p:pic>
+      <p:sp>
+        <p:nvSpPr>
+          <p:cNvPr id="5" name="Text Placeholder 4"/>
+          <p:cNvSpPr>
+            <a:spLocks noGrp="1"/>
+          </p:cNvSpPr>
+          <p:nvPr>
+            <p:ph type="body" sz="quarter" idx="3"/>
+          </p:nvPr>
+        </p:nvSpPr>
+        <p:spPr/>
+        <p:txBody>
+          <a:bodyPr/>
+          <a:lstStyle/>
+          <a:p>
+            <a:r>
+              <a:rPr lang="en-US" dirty="0" smtClean="0"/>
+              <a:t>Results</a:t>
+            </a:r>
+            <a:endParaRPr lang="en-US" dirty="0"/>
+          </a:p>
+        </p:txBody>
+      </p:sp>
+      <p:pic>
+        <p:nvPicPr>
+          <p:cNvPr id="8" name="Content Placeholder 7"/>
+          <p:cNvPicPr>
+            <a:picLocks noGrp="1" noChangeAspect="1"/>
+          </p:cNvPicPr>
+          <p:nvPr>
+            <p:ph sz="quarter" idx="4"/>
+          </p:nvPr>
+        </p:nvPicPr>
+        <p:blipFill>
+          <a:blip r:embed="rId3">
+            <a:extLst>
+              <a:ext uri="{28A0092B-C50C-407E-A947-70E740481C1C}">
+                <a14:useLocalDpi xmlns:a14="http://schemas.microsoft.com/office/drawing/2010/main" val="0"/>
+              </a:ext>
+            </a:extLst>
+          </a:blip>
+          <a:stretch>
+            <a:fillRect/>
+          </a:stretch>
+        </p:blipFill>
+        <p:spPr>
+          <a:xfrm>
+            <a:off x="5233094" y="2567436"/>
+            <a:ext cx="2975491" cy="2902023"/>
+          </a:xfrm>
+        </p:spPr>
+      </p:pic>
+    </p:spTree>
+    <p:extLst>
+      <p:ext uri="{BB962C8B-B14F-4D97-AF65-F5344CB8AC3E}">
+        <p14:creationId xmlns:p14="http://schemas.microsoft.com/office/powerpoint/2010/main" val="3036167241"/>
+      </p:ext>
+    </p:extLst>
+  </p:cSld>
+  <p:clrMapOvr>
+    <a:masterClrMapping/>
+  </p:clrMapOvr>
+</p:sld>
+</file>
+
+<file path=ppt/slides/slide14.xml><?xml version="1.0" encoding="utf-8"?>
+<p:sld xmlns:a="http://schemas.openxmlformats.org/drawingml/2006/main" xmlns:r="http://schemas.openxmlformats.org/officeDocument/2006/relationships" xmlns:p="http://schemas.openxmlformats.org/presentationml/2006/main">
+  <p:cSld>
+    <p:spTree>
+      <p:nvGrpSpPr>
+        <p:cNvPr id="1" name=""/>
+        <p:cNvGrpSpPr/>
+        <p:nvPr/>
+      </p:nvGrpSpPr>
+      <p:grpSpPr>
+        <a:xfrm>
+          <a:off x="0" y="0"/>
+          <a:ext cx="0" cy="0"/>
+          <a:chOff x="0" y="0"/>
+          <a:chExt cx="0" cy="0"/>
+        </a:xfrm>
+      </p:grpSpPr>
+      <p:sp>
+        <p:nvSpPr>
+          <p:cNvPr id="2" name="Title 1"/>
+          <p:cNvSpPr>
+            <a:spLocks noGrp="1"/>
+          </p:cNvSpPr>
+          <p:nvPr>
+            <p:ph type="title"/>
+          </p:nvPr>
+        </p:nvSpPr>
+        <p:spPr/>
+        <p:txBody>
+          <a:bodyPr>
+            <a:normAutofit/>
+          </a:bodyPr>
+          <a:lstStyle/>
+          <a:p>
+            <a:r>
+              <a:rPr lang="en-US" dirty="0" smtClean="0"/>
+              <a:t>Top </a:t>
+            </a:r>
+            <a:r>
+              <a:rPr lang="en-US" dirty="0"/>
+              <a:t>3 things I</a:t>
+            </a:r>
+            <a:r>
+              <a:rPr lang="en-US" dirty="0" smtClean="0"/>
+              <a:t> </a:t>
+            </a:r>
+            <a:r>
+              <a:rPr lang="en-US" dirty="0"/>
+              <a:t>learned in the </a:t>
+            </a:r>
+            <a:r>
+              <a:rPr lang="en-US" dirty="0" smtClean="0"/>
+              <a:t>course</a:t>
+            </a:r>
+            <a:endParaRPr lang="en-US" dirty="0"/>
+          </a:p>
+        </p:txBody>
+      </p:sp>
+      <p:sp>
+        <p:nvSpPr>
+          <p:cNvPr id="3" name="Content Placeholder 2"/>
+          <p:cNvSpPr>
+            <a:spLocks noGrp="1"/>
+          </p:cNvSpPr>
+          <p:nvPr>
+            <p:ph idx="1"/>
+          </p:nvPr>
+        </p:nvSpPr>
+        <p:spPr/>
+        <p:txBody>
+          <a:bodyPr/>
+          <a:lstStyle/>
+          <a:p>
+            <a:r>
+              <a:rPr lang="en-US" dirty="0" smtClean="0"/>
+              <a:t>Learn </a:t>
+            </a:r>
+            <a:r>
+              <a:rPr lang="en-US" dirty="0" err="1" smtClean="0"/>
+              <a:t>NodeJS</a:t>
+            </a:r>
+            <a:endParaRPr lang="en-US" dirty="0" smtClean="0"/>
+          </a:p>
+          <a:p>
+            <a:pPr lvl="1"/>
+            <a:r>
+              <a:rPr lang="en-US" dirty="0" smtClean="0"/>
+              <a:t>The use of MVC for </a:t>
+            </a:r>
+            <a:r>
+              <a:rPr lang="en-US" dirty="0" err="1" smtClean="0"/>
+              <a:t>NodeJS</a:t>
+            </a:r>
+            <a:endParaRPr lang="en-US" dirty="0" smtClean="0"/>
+          </a:p>
+          <a:p>
+            <a:pPr lvl="1"/>
+            <a:r>
+              <a:rPr lang="en-US" dirty="0" smtClean="0"/>
+              <a:t>How to use the template engine Jade</a:t>
+            </a:r>
+          </a:p>
+          <a:p>
+            <a:r>
+              <a:rPr lang="en-US" dirty="0" smtClean="0"/>
+              <a:t>Learn How to develop an application using Express</a:t>
+            </a:r>
+          </a:p>
+          <a:p>
+            <a:pPr lvl="1"/>
+            <a:r>
+              <a:rPr lang="en-US" dirty="0" smtClean="0"/>
+              <a:t>Deploying a server</a:t>
+            </a:r>
+          </a:p>
+          <a:p>
+            <a:r>
+              <a:rPr lang="en-US" dirty="0" smtClean="0"/>
+              <a:t>Learn how to use and test Mocha &amp; </a:t>
+            </a:r>
+            <a:r>
+              <a:rPr lang="en-US" dirty="0" err="1" smtClean="0"/>
+              <a:t>QUnit</a:t>
+            </a:r>
+            <a:endParaRPr lang="en-US" dirty="0"/>
+          </a:p>
+        </p:txBody>
+      </p:sp>
+    </p:spTree>
+    <p:extLst>
+      <p:ext uri="{BB962C8B-B14F-4D97-AF65-F5344CB8AC3E}">
+        <p14:creationId xmlns:p14="http://schemas.microsoft.com/office/powerpoint/2010/main" val="409204155"/>
+      </p:ext>
+    </p:extLst>
+  </p:cSld>
+  <p:clrMapOvr>
+    <a:masterClrMapping/>
+  </p:clrMapOvr>
+</p:sld>
+</file>
+
 <file path=ppt/slides/slide2.xml><?xml version="1.0" encoding="utf-8"?>
 <p:sld xmlns:a="http://schemas.openxmlformats.org/drawingml/2006/main" xmlns:r="http://schemas.openxmlformats.org/officeDocument/2006/relationships" xmlns:p="http://schemas.openxmlformats.org/presentationml/2006/main">
   <p:cSld>
@@ -3498,104 +4175,132 @@
       </p:grpSpPr>
       <p:sp>
         <p:nvSpPr>
-          <p:cNvPr id="2" name="TextBox 1"/>
-          <p:cNvSpPr txBox="1"/>
-          <p:nvPr/>
-        </p:nvSpPr>
+          <p:cNvPr id="2" name="Title 1"/>
+          <p:cNvSpPr>
+            <a:spLocks noGrp="1"/>
+          </p:cNvSpPr>
+          <p:nvPr>
+            <p:ph type="title"/>
+          </p:nvPr>
+        </p:nvSpPr>
+        <p:spPr/>
+        <p:txBody>
+          <a:bodyPr>
+            <a:normAutofit fontScale="90000"/>
+          </a:bodyPr>
+          <a:lstStyle/>
+          <a:p>
+            <a:r>
+              <a:rPr lang="en-US" dirty="0"/>
+              <a:t>A bar graph showing the top 10 colleges by enrollment </a:t>
+            </a:r>
+          </a:p>
+        </p:txBody>
+      </p:sp>
+      <p:sp>
+        <p:nvSpPr>
+          <p:cNvPr id="3" name="Text Placeholder 2"/>
+          <p:cNvSpPr>
+            <a:spLocks noGrp="1"/>
+          </p:cNvSpPr>
+          <p:nvPr>
+            <p:ph type="body" idx="1"/>
+          </p:nvPr>
+        </p:nvSpPr>
+        <p:spPr/>
+        <p:txBody>
+          <a:bodyPr/>
+          <a:lstStyle/>
+          <a:p>
+            <a:r>
+              <a:rPr lang="en-US" dirty="0" smtClean="0"/>
+              <a:t>Result</a:t>
+            </a:r>
+            <a:endParaRPr lang="en-US" dirty="0"/>
+          </a:p>
+        </p:txBody>
+      </p:sp>
+      <p:pic>
+        <p:nvPicPr>
+          <p:cNvPr id="7" name="Content Placeholder 6" descr="Screen Shot 2015-05-13 at 06.50.18.png"/>
+          <p:cNvPicPr>
+            <a:picLocks noGrp="1" noChangeAspect="1"/>
+          </p:cNvPicPr>
+          <p:nvPr>
+            <p:ph sz="half" idx="2"/>
+          </p:nvPr>
+        </p:nvPicPr>
+        <p:blipFill>
+          <a:blip r:embed="rId2">
+            <a:extLst>
+              <a:ext uri="{28A0092B-C50C-407E-A947-70E740481C1C}">
+                <a14:useLocalDpi xmlns:a14="http://schemas.microsoft.com/office/drawing/2010/main" val="0"/>
+              </a:ext>
+            </a:extLst>
+          </a:blip>
+          <a:srcRect t="-11630" b="-11630"/>
+          <a:stretch>
+            <a:fillRect/>
+          </a:stretch>
+        </p:blipFill>
+        <p:spPr/>
+      </p:pic>
+      <p:sp>
+        <p:nvSpPr>
+          <p:cNvPr id="5" name="Text Placeholder 4"/>
+          <p:cNvSpPr>
+            <a:spLocks noGrp="1"/>
+          </p:cNvSpPr>
+          <p:nvPr>
+            <p:ph type="body" sz="quarter" idx="3"/>
+          </p:nvPr>
+        </p:nvSpPr>
+        <p:spPr/>
+        <p:txBody>
+          <a:bodyPr/>
+          <a:lstStyle/>
+          <a:p>
+            <a:r>
+              <a:rPr lang="en-US" dirty="0" smtClean="0"/>
+              <a:t>Code</a:t>
+            </a:r>
+            <a:endParaRPr lang="en-US" dirty="0"/>
+          </a:p>
+        </p:txBody>
+      </p:sp>
+      <p:pic>
+        <p:nvPicPr>
+          <p:cNvPr id="8" name="Content Placeholder 7"/>
+          <p:cNvPicPr>
+            <a:picLocks noGrp="1" noChangeAspect="1"/>
+          </p:cNvPicPr>
+          <p:nvPr>
+            <p:ph sz="quarter" idx="4"/>
+          </p:nvPr>
+        </p:nvPicPr>
+        <p:blipFill>
+          <a:blip r:embed="rId3">
+            <a:extLst>
+              <a:ext uri="{28A0092B-C50C-407E-A947-70E740481C1C}">
+                <a14:useLocalDpi xmlns:a14="http://schemas.microsoft.com/office/drawing/2010/main" val="0"/>
+              </a:ext>
+            </a:extLst>
+          </a:blip>
+          <a:stretch>
+            <a:fillRect/>
+          </a:stretch>
+        </p:blipFill>
         <p:spPr>
           <a:xfrm>
-            <a:off x="957078" y="1122678"/>
-            <a:ext cx="7521607" cy="3139321"/>
+            <a:off x="4971152" y="2438400"/>
+            <a:ext cx="3499059" cy="3951288"/>
           </a:xfrm>
-          <a:prstGeom prst="rect">
-            <a:avLst/>
-          </a:prstGeom>
-          <a:noFill/>
         </p:spPr>
-        <p:txBody>
-          <a:bodyPr wrap="square" rtlCol="0">
-            <a:spAutoFit/>
-          </a:bodyPr>
-          <a:lstStyle/>
-          <a:p>
-            <a:pPr lvl="0"/>
-            <a:r>
-              <a:rPr lang="en-US" dirty="0"/>
-              <a:t>A screen shot / photo of the programs output that answers the question</a:t>
-            </a:r>
-          </a:p>
-          <a:p>
-            <a:pPr lvl="0"/>
-            <a:r>
-              <a:rPr lang="en-US" dirty="0"/>
-              <a:t>A screen shot of the relevant backend code that prepares the results of the query for display</a:t>
-            </a:r>
-          </a:p>
-          <a:p>
-            <a:pPr lvl="0"/>
-            <a:r>
-              <a:rPr lang="en-US" dirty="0"/>
-              <a:t>A screen shot of the front end</a:t>
-            </a:r>
-          </a:p>
-          <a:p>
-            <a:r>
-              <a:rPr lang="en-US" dirty="0"/>
-              <a:t>Your PowerPoint should also include the following slides:</a:t>
-            </a:r>
-          </a:p>
-          <a:p>
-            <a:pPr lvl="0"/>
-            <a:r>
-              <a:rPr lang="en-US" dirty="0"/>
-              <a:t>A title slide with your name and the name of the project and course</a:t>
-            </a:r>
-          </a:p>
-          <a:p>
-            <a:pPr lvl="0"/>
-            <a:r>
-              <a:rPr lang="en-US" dirty="0"/>
-              <a:t>A slide that displays the home page of your </a:t>
-            </a:r>
-            <a:r>
-              <a:rPr lang="en-US" dirty="0" err="1"/>
-              <a:t>github</a:t>
-            </a:r>
-            <a:r>
-              <a:rPr lang="en-US" dirty="0"/>
-              <a:t> account</a:t>
-            </a:r>
-          </a:p>
-          <a:p>
-            <a:pPr lvl="0"/>
-            <a:r>
-              <a:rPr lang="en-US" dirty="0"/>
-              <a:t>A slide that displays your code academy profile showing your badges and the completion percent of your PHP course.</a:t>
-            </a:r>
-          </a:p>
-          <a:p>
-            <a:pPr lvl="0"/>
-            <a:r>
-              <a:rPr lang="en-US" dirty="0"/>
-              <a:t>A screen shot of your unit test code and results</a:t>
-            </a:r>
-          </a:p>
-          <a:p>
-            <a:r>
-              <a:rPr lang="en-US" dirty="0"/>
-              <a:t>A final slide that lists the top 3 things you learned in the course</a:t>
-            </a:r>
-            <a:r>
-              <a:rPr lang="en-US" dirty="0"/>
-              <a:t> </a:t>
-            </a:r>
-          </a:p>
-        </p:txBody>
-      </p:sp>
+      </p:pic>
     </p:spTree>
     <p:extLst>
       <p:ext uri="{BB962C8B-B14F-4D97-AF65-F5344CB8AC3E}">
-        <p14:creationId xmlns:p14="http://schemas.microsoft.com/office/powerpoint/2010/main" val="540786920"/>
+        <p14:creationId xmlns:p14="http://schemas.microsoft.com/office/powerpoint/2010/main" val="2166707761"/>
       </p:ext>
     </p:extLst>
   </p:cSld>
@@ -3634,55 +4339,135 @@
         </p:nvSpPr>
         <p:spPr/>
         <p:txBody>
-          <a:bodyPr/>
-          <a:lstStyle/>
-          <a:p>
-            <a:endParaRPr lang="en-US"/>
-          </a:p>
-        </p:txBody>
-      </p:sp>
-      <p:sp>
-        <p:nvSpPr>
-          <p:cNvPr id="3" name="Content Placeholder 2"/>
-          <p:cNvSpPr>
-            <a:spLocks noGrp="1"/>
-          </p:cNvSpPr>
-          <p:nvPr>
-            <p:ph idx="1"/>
-          </p:nvPr>
-        </p:nvSpPr>
-        <p:spPr/>
-        <p:txBody>
-          <a:bodyPr/>
-          <a:lstStyle/>
-          <a:p>
-            <a:endParaRPr lang="en-US"/>
-          </a:p>
-        </p:txBody>
-      </p:sp>
-      <p:sp>
-        <p:nvSpPr>
-          <p:cNvPr id="4" name="Text Placeholder 3"/>
-          <p:cNvSpPr>
-            <a:spLocks noGrp="1"/>
-          </p:cNvSpPr>
-          <p:nvPr>
-            <p:ph type="body" sz="half" idx="2"/>
-          </p:nvPr>
-        </p:nvSpPr>
-        <p:spPr/>
-        <p:txBody>
-          <a:bodyPr/>
-          <a:lstStyle/>
-          <a:p>
-            <a:endParaRPr lang="en-US"/>
-          </a:p>
-        </p:txBody>
-      </p:sp>
+          <a:bodyPr>
+            <a:normAutofit/>
+          </a:bodyPr>
+          <a:lstStyle/>
+          <a:p>
+            <a:r>
+              <a:rPr lang="en-US" dirty="0"/>
+              <a:t>G</a:t>
+            </a:r>
+            <a:r>
+              <a:rPr lang="en-US" dirty="0" smtClean="0"/>
+              <a:t>ender </a:t>
+            </a:r>
+            <a:r>
+              <a:rPr lang="en-US" dirty="0"/>
+              <a:t>distribution of a college </a:t>
+            </a:r>
+          </a:p>
+        </p:txBody>
+      </p:sp>
+      <p:sp>
+        <p:nvSpPr>
+          <p:cNvPr id="3" name="Text Placeholder 2"/>
+          <p:cNvSpPr>
+            <a:spLocks noGrp="1"/>
+          </p:cNvSpPr>
+          <p:nvPr>
+            <p:ph type="body" idx="1"/>
+          </p:nvPr>
+        </p:nvSpPr>
+        <p:spPr/>
+        <p:txBody>
+          <a:bodyPr/>
+          <a:lstStyle/>
+          <a:p>
+            <a:r>
+              <a:rPr lang="en-US" dirty="0" smtClean="0"/>
+              <a:t>Result</a:t>
+            </a:r>
+            <a:endParaRPr lang="en-US" dirty="0"/>
+          </a:p>
+        </p:txBody>
+      </p:sp>
+      <p:pic>
+        <p:nvPicPr>
+          <p:cNvPr id="7" name="Content Placeholder 6"/>
+          <p:cNvPicPr>
+            <a:picLocks noGrp="1" noChangeAspect="1"/>
+          </p:cNvPicPr>
+          <p:nvPr>
+            <p:ph sz="half" idx="2"/>
+          </p:nvPr>
+        </p:nvPicPr>
+        <p:blipFill>
+          <a:blip r:embed="rId2">
+            <a:extLst>
+              <a:ext uri="{28A0092B-C50C-407E-A947-70E740481C1C}">
+                <a14:useLocalDpi xmlns:a14="http://schemas.microsoft.com/office/drawing/2010/main" val="0"/>
+              </a:ext>
+            </a:extLst>
+          </a:blip>
+          <a:srcRect/>
+          <a:stretch>
+            <a:fillRect/>
+          </a:stretch>
+        </p:blipFill>
+        <p:spPr>
+          <a:xfrm>
+            <a:off x="483560" y="2438400"/>
+            <a:ext cx="3879200" cy="3951288"/>
+          </a:xfrm>
+        </p:spPr>
+      </p:pic>
+      <p:sp>
+        <p:nvSpPr>
+          <p:cNvPr id="5" name="Text Placeholder 4"/>
+          <p:cNvSpPr>
+            <a:spLocks noGrp="1"/>
+          </p:cNvSpPr>
+          <p:nvPr>
+            <p:ph type="body" sz="quarter" idx="3"/>
+          </p:nvPr>
+        </p:nvSpPr>
+        <p:spPr/>
+        <p:txBody>
+          <a:bodyPr/>
+          <a:lstStyle/>
+          <a:p>
+            <a:r>
+              <a:rPr lang="en-US" dirty="0" smtClean="0"/>
+              <a:t>Code</a:t>
+            </a:r>
+            <a:endParaRPr lang="en-US" dirty="0"/>
+          </a:p>
+        </p:txBody>
+      </p:sp>
+      <p:pic>
+        <p:nvPicPr>
+          <p:cNvPr id="8" name="Content Placeholder 7"/>
+          <p:cNvPicPr>
+            <a:picLocks noGrp="1" noChangeAspect="1"/>
+          </p:cNvPicPr>
+          <p:nvPr>
+            <p:ph sz="quarter" idx="4"/>
+          </p:nvPr>
+        </p:nvPicPr>
+        <p:blipFill>
+          <a:blip r:embed="rId3">
+            <a:extLst>
+              <a:ext uri="{28A0092B-C50C-407E-A947-70E740481C1C}">
+                <a14:useLocalDpi xmlns:a14="http://schemas.microsoft.com/office/drawing/2010/main" val="0"/>
+              </a:ext>
+            </a:extLst>
+          </a:blip>
+          <a:stretch>
+            <a:fillRect/>
+          </a:stretch>
+        </p:blipFill>
+        <p:spPr>
+          <a:xfrm>
+            <a:off x="4754563" y="2847937"/>
+            <a:ext cx="3932237" cy="3132213"/>
+          </a:xfrm>
+        </p:spPr>
+      </p:pic>
     </p:spTree>
     <p:extLst>
       <p:ext uri="{BB962C8B-B14F-4D97-AF65-F5344CB8AC3E}">
-        <p14:creationId xmlns:p14="http://schemas.microsoft.com/office/powerpoint/2010/main" val="4025885532"/>
+        <p14:creationId xmlns:p14="http://schemas.microsoft.com/office/powerpoint/2010/main" val="2124025343"/>
       </p:ext>
     </p:extLst>
   </p:cSld>
@@ -3721,36 +4506,134 @@
         </p:nvSpPr>
         <p:spPr/>
         <p:txBody>
-          <a:bodyPr/>
-          <a:lstStyle/>
-          <a:p>
-            <a:endParaRPr lang="en-US"/>
-          </a:p>
-        </p:txBody>
-      </p:sp>
-      <p:sp>
-        <p:nvSpPr>
-          <p:cNvPr id="3" name="Content Placeholder 2"/>
-          <p:cNvSpPr>
-            <a:spLocks noGrp="1"/>
-          </p:cNvSpPr>
-          <p:nvPr>
-            <p:ph idx="1"/>
-          </p:nvPr>
-        </p:nvSpPr>
-        <p:spPr/>
-        <p:txBody>
-          <a:bodyPr/>
-          <a:lstStyle/>
-          <a:p>
-            <a:endParaRPr lang="en-US"/>
-          </a:p>
-        </p:txBody>
-      </p:sp>
+          <a:bodyPr>
+            <a:normAutofit/>
+          </a:bodyPr>
+          <a:lstStyle/>
+          <a:p>
+            <a:r>
+              <a:rPr lang="en-US" dirty="0"/>
+              <a:t>G</a:t>
+            </a:r>
+            <a:r>
+              <a:rPr lang="en-US" dirty="0" smtClean="0"/>
+              <a:t>ender </a:t>
+            </a:r>
+            <a:r>
+              <a:rPr lang="en-US" dirty="0"/>
+              <a:t>distribution of a college </a:t>
+            </a:r>
+          </a:p>
+        </p:txBody>
+      </p:sp>
+      <p:sp>
+        <p:nvSpPr>
+          <p:cNvPr id="3" name="Text Placeholder 2"/>
+          <p:cNvSpPr>
+            <a:spLocks noGrp="1"/>
+          </p:cNvSpPr>
+          <p:nvPr>
+            <p:ph type="body" idx="1"/>
+          </p:nvPr>
+        </p:nvSpPr>
+        <p:spPr/>
+        <p:txBody>
+          <a:bodyPr/>
+          <a:lstStyle/>
+          <a:p>
+            <a:r>
+              <a:rPr lang="en-US" dirty="0" smtClean="0"/>
+              <a:t>Result</a:t>
+            </a:r>
+            <a:endParaRPr lang="en-US" dirty="0"/>
+          </a:p>
+        </p:txBody>
+      </p:sp>
+      <p:pic>
+        <p:nvPicPr>
+          <p:cNvPr id="7" name="Content Placeholder 6"/>
+          <p:cNvPicPr>
+            <a:picLocks noGrp="1" noChangeAspect="1"/>
+          </p:cNvPicPr>
+          <p:nvPr>
+            <p:ph sz="half" idx="2"/>
+          </p:nvPr>
+        </p:nvPicPr>
+        <p:blipFill>
+          <a:blip r:embed="rId2">
+            <a:extLst>
+              <a:ext uri="{28A0092B-C50C-407E-A947-70E740481C1C}">
+                <a14:useLocalDpi xmlns:a14="http://schemas.microsoft.com/office/drawing/2010/main" val="0"/>
+              </a:ext>
+            </a:extLst>
+          </a:blip>
+          <a:stretch>
+            <a:fillRect/>
+          </a:stretch>
+        </p:blipFill>
+        <p:spPr>
+          <a:xfrm>
+            <a:off x="483560" y="2869548"/>
+            <a:ext cx="3879200" cy="3088992"/>
+          </a:xfrm>
+        </p:spPr>
+      </p:pic>
+      <p:sp>
+        <p:nvSpPr>
+          <p:cNvPr id="5" name="Text Placeholder 4"/>
+          <p:cNvSpPr>
+            <a:spLocks noGrp="1"/>
+          </p:cNvSpPr>
+          <p:nvPr>
+            <p:ph type="body" sz="quarter" idx="3"/>
+          </p:nvPr>
+        </p:nvSpPr>
+        <p:spPr/>
+        <p:txBody>
+          <a:bodyPr/>
+          <a:lstStyle/>
+          <a:p>
+            <a:r>
+              <a:rPr lang="en-US" dirty="0" smtClean="0"/>
+              <a:t>Code</a:t>
+            </a:r>
+            <a:endParaRPr lang="en-US" dirty="0"/>
+          </a:p>
+        </p:txBody>
+      </p:sp>
+      <p:pic>
+        <p:nvPicPr>
+          <p:cNvPr id="8" name="Content Placeholder 7"/>
+          <p:cNvPicPr>
+            <a:picLocks noGrp="1" noChangeAspect="1"/>
+          </p:cNvPicPr>
+          <p:nvPr>
+            <p:ph sz="quarter" idx="4"/>
+          </p:nvPr>
+        </p:nvPicPr>
+        <p:blipFill>
+          <a:blip r:embed="rId3">
+            <a:extLst>
+              <a:ext uri="{28A0092B-C50C-407E-A947-70E740481C1C}">
+                <a14:useLocalDpi xmlns:a14="http://schemas.microsoft.com/office/drawing/2010/main" val="0"/>
+              </a:ext>
+            </a:extLst>
+          </a:blip>
+          <a:stretch>
+            <a:fillRect/>
+          </a:stretch>
+        </p:blipFill>
+        <p:spPr>
+          <a:xfrm>
+            <a:off x="4754563" y="3104292"/>
+            <a:ext cx="3932237" cy="2619502"/>
+          </a:xfrm>
+        </p:spPr>
+      </p:pic>
     </p:spTree>
     <p:extLst>
       <p:ext uri="{BB962C8B-B14F-4D97-AF65-F5344CB8AC3E}">
-        <p14:creationId xmlns:p14="http://schemas.microsoft.com/office/powerpoint/2010/main" val="378457933"/>
+        <p14:creationId xmlns:p14="http://schemas.microsoft.com/office/powerpoint/2010/main" val="840976044"/>
       </p:ext>
     </p:extLst>
   </p:cSld>
@@ -3789,55 +4672,710 @@
         </p:nvSpPr>
         <p:spPr/>
         <p:txBody>
-          <a:bodyPr/>
-          <a:lstStyle/>
-          <a:p>
-            <a:endParaRPr lang="en-US"/>
-          </a:p>
-        </p:txBody>
-      </p:sp>
-      <p:sp>
-        <p:nvSpPr>
-          <p:cNvPr id="3" name="Content Placeholder 2"/>
-          <p:cNvSpPr>
-            <a:spLocks noGrp="1"/>
-          </p:cNvSpPr>
-          <p:nvPr>
-            <p:ph sz="half" idx="1"/>
-          </p:nvPr>
-        </p:nvSpPr>
-        <p:spPr/>
-        <p:txBody>
-          <a:bodyPr/>
-          <a:lstStyle/>
-          <a:p>
-            <a:endParaRPr lang="en-US"/>
-          </a:p>
-        </p:txBody>
-      </p:sp>
-      <p:sp>
-        <p:nvSpPr>
-          <p:cNvPr id="4" name="Content Placeholder 3"/>
-          <p:cNvSpPr>
-            <a:spLocks noGrp="1"/>
-          </p:cNvSpPr>
+          <a:bodyPr>
+            <a:normAutofit/>
+          </a:bodyPr>
+          <a:lstStyle/>
+          <a:p>
+            <a:r>
+              <a:rPr lang="en-US" dirty="0" smtClean="0"/>
+              <a:t>List of Colleges</a:t>
+            </a:r>
+            <a:endParaRPr lang="en-US" dirty="0"/>
+          </a:p>
+        </p:txBody>
+      </p:sp>
+      <p:sp>
+        <p:nvSpPr>
+          <p:cNvPr id="3" name="Text Placeholder 2"/>
+          <p:cNvSpPr>
+            <a:spLocks noGrp="1"/>
+          </p:cNvSpPr>
+          <p:nvPr>
+            <p:ph type="body" idx="1"/>
+          </p:nvPr>
+        </p:nvSpPr>
+        <p:spPr/>
+        <p:txBody>
+          <a:bodyPr/>
+          <a:lstStyle/>
+          <a:p>
+            <a:r>
+              <a:rPr lang="en-US" dirty="0" smtClean="0"/>
+              <a:t>Result</a:t>
+            </a:r>
+            <a:endParaRPr lang="en-US" dirty="0"/>
+          </a:p>
+        </p:txBody>
+      </p:sp>
+      <p:pic>
+        <p:nvPicPr>
+          <p:cNvPr id="7" name="Content Placeholder 6"/>
+          <p:cNvPicPr>
+            <a:picLocks noGrp="1" noChangeAspect="1"/>
+          </p:cNvPicPr>
           <p:nvPr>
             <p:ph sz="half" idx="2"/>
           </p:nvPr>
-        </p:nvSpPr>
-        <p:spPr/>
-        <p:txBody>
-          <a:bodyPr/>
-          <a:lstStyle/>
-          <a:p>
-            <a:endParaRPr lang="en-US"/>
-          </a:p>
-        </p:txBody>
-      </p:sp>
+        </p:nvPicPr>
+        <p:blipFill>
+          <a:blip r:embed="rId2">
+            <a:extLst>
+              <a:ext uri="{28A0092B-C50C-407E-A947-70E740481C1C}">
+                <a14:useLocalDpi xmlns:a14="http://schemas.microsoft.com/office/drawing/2010/main" val="0"/>
+              </a:ext>
+            </a:extLst>
+          </a:blip>
+          <a:stretch>
+            <a:fillRect/>
+          </a:stretch>
+        </p:blipFill>
+        <p:spPr>
+          <a:xfrm>
+            <a:off x="798065" y="2869548"/>
+            <a:ext cx="3250189" cy="3088992"/>
+          </a:xfrm>
+        </p:spPr>
+      </p:pic>
+      <p:sp>
+        <p:nvSpPr>
+          <p:cNvPr id="5" name="Text Placeholder 4"/>
+          <p:cNvSpPr>
+            <a:spLocks noGrp="1"/>
+          </p:cNvSpPr>
+          <p:nvPr>
+            <p:ph type="body" sz="quarter" idx="3"/>
+          </p:nvPr>
+        </p:nvSpPr>
+        <p:spPr/>
+        <p:txBody>
+          <a:bodyPr/>
+          <a:lstStyle/>
+          <a:p>
+            <a:r>
+              <a:rPr lang="en-US" dirty="0" smtClean="0"/>
+              <a:t>Code</a:t>
+            </a:r>
+            <a:endParaRPr lang="en-US" dirty="0"/>
+          </a:p>
+        </p:txBody>
+      </p:sp>
+      <p:pic>
+        <p:nvPicPr>
+          <p:cNvPr id="8" name="Content Placeholder 7"/>
+          <p:cNvPicPr>
+            <a:picLocks noGrp="1" noChangeAspect="1"/>
+          </p:cNvPicPr>
+          <p:nvPr>
+            <p:ph sz="quarter" idx="4"/>
+          </p:nvPr>
+        </p:nvPicPr>
+        <p:blipFill>
+          <a:blip r:embed="rId3">
+            <a:extLst>
+              <a:ext uri="{28A0092B-C50C-407E-A947-70E740481C1C}">
+                <a14:useLocalDpi xmlns:a14="http://schemas.microsoft.com/office/drawing/2010/main" val="0"/>
+              </a:ext>
+            </a:extLst>
+          </a:blip>
+          <a:stretch>
+            <a:fillRect/>
+          </a:stretch>
+        </p:blipFill>
+        <p:spPr>
+          <a:xfrm>
+            <a:off x="4754563" y="3787906"/>
+            <a:ext cx="3932237" cy="1252273"/>
+          </a:xfrm>
+        </p:spPr>
+      </p:pic>
     </p:spTree>
     <p:extLst>
       <p:ext uri="{BB962C8B-B14F-4D97-AF65-F5344CB8AC3E}">
-        <p14:creationId xmlns:p14="http://schemas.microsoft.com/office/powerpoint/2010/main" val="1961513849"/>
+        <p14:creationId xmlns:p14="http://schemas.microsoft.com/office/powerpoint/2010/main" val="904564489"/>
+      </p:ext>
+    </p:extLst>
+  </p:cSld>
+  <p:clrMapOvr>
+    <a:masterClrMapping/>
+  </p:clrMapOvr>
+</p:sld>
+</file>
+
+<file path=ppt/slides/slide6.xml><?xml version="1.0" encoding="utf-8"?>
+<p:sld xmlns:a="http://schemas.openxmlformats.org/drawingml/2006/main" xmlns:r="http://schemas.openxmlformats.org/officeDocument/2006/relationships" xmlns:p="http://schemas.openxmlformats.org/presentationml/2006/main">
+  <p:cSld>
+    <p:spTree>
+      <p:nvGrpSpPr>
+        <p:cNvPr id="1" name=""/>
+        <p:cNvGrpSpPr/>
+        <p:nvPr/>
+      </p:nvGrpSpPr>
+      <p:grpSpPr>
+        <a:xfrm>
+          <a:off x="0" y="0"/>
+          <a:ext cx="0" cy="0"/>
+          <a:chOff x="0" y="0"/>
+          <a:chExt cx="0" cy="0"/>
+        </a:xfrm>
+      </p:grpSpPr>
+      <p:sp>
+        <p:nvSpPr>
+          <p:cNvPr id="2" name="Title 1"/>
+          <p:cNvSpPr>
+            <a:spLocks noGrp="1"/>
+          </p:cNvSpPr>
+          <p:nvPr>
+            <p:ph type="title"/>
+          </p:nvPr>
+        </p:nvSpPr>
+        <p:spPr/>
+        <p:txBody>
+          <a:bodyPr>
+            <a:normAutofit/>
+          </a:bodyPr>
+          <a:lstStyle/>
+          <a:p>
+            <a:r>
+              <a:rPr lang="en-US" dirty="0" smtClean="0"/>
+              <a:t>List of Colleges</a:t>
+            </a:r>
+            <a:endParaRPr lang="en-US" dirty="0"/>
+          </a:p>
+        </p:txBody>
+      </p:sp>
+      <p:sp>
+        <p:nvSpPr>
+          <p:cNvPr id="3" name="Text Placeholder 2"/>
+          <p:cNvSpPr>
+            <a:spLocks noGrp="1"/>
+          </p:cNvSpPr>
+          <p:nvPr>
+            <p:ph type="body" idx="1"/>
+          </p:nvPr>
+        </p:nvSpPr>
+        <p:spPr/>
+        <p:txBody>
+          <a:bodyPr/>
+          <a:lstStyle/>
+          <a:p>
+            <a:r>
+              <a:rPr lang="en-US" dirty="0" err="1" smtClean="0"/>
+              <a:t>Upload.jade</a:t>
+            </a:r>
+            <a:endParaRPr lang="en-US" dirty="0"/>
+          </a:p>
+        </p:txBody>
+      </p:sp>
+      <p:pic>
+        <p:nvPicPr>
+          <p:cNvPr id="7" name="Content Placeholder 6"/>
+          <p:cNvPicPr>
+            <a:picLocks noGrp="1" noChangeAspect="1"/>
+          </p:cNvPicPr>
+          <p:nvPr>
+            <p:ph sz="half" idx="2"/>
+          </p:nvPr>
+        </p:nvPicPr>
+        <p:blipFill>
+          <a:blip r:embed="rId2">
+            <a:extLst>
+              <a:ext uri="{28A0092B-C50C-407E-A947-70E740481C1C}">
+                <a14:useLocalDpi xmlns:a14="http://schemas.microsoft.com/office/drawing/2010/main" val="0"/>
+              </a:ext>
+            </a:extLst>
+          </a:blip>
+          <a:stretch>
+            <a:fillRect/>
+          </a:stretch>
+        </p:blipFill>
+        <p:spPr>
+          <a:xfrm>
+            <a:off x="798065" y="3105952"/>
+            <a:ext cx="3250189" cy="2616183"/>
+          </a:xfrm>
+        </p:spPr>
+      </p:pic>
+      <p:sp>
+        <p:nvSpPr>
+          <p:cNvPr id="5" name="Text Placeholder 4"/>
+          <p:cNvSpPr>
+            <a:spLocks noGrp="1"/>
+          </p:cNvSpPr>
+          <p:nvPr>
+            <p:ph type="body" sz="quarter" idx="3"/>
+          </p:nvPr>
+        </p:nvSpPr>
+        <p:spPr/>
+        <p:txBody>
+          <a:bodyPr/>
+          <a:lstStyle/>
+          <a:p>
+            <a:r>
+              <a:rPr lang="en-US" dirty="0" smtClean="0"/>
+              <a:t>Code</a:t>
+            </a:r>
+            <a:endParaRPr lang="en-US" dirty="0"/>
+          </a:p>
+        </p:txBody>
+      </p:sp>
+      <p:pic>
+        <p:nvPicPr>
+          <p:cNvPr id="8" name="Content Placeholder 7"/>
+          <p:cNvPicPr>
+            <a:picLocks noGrp="1" noChangeAspect="1"/>
+          </p:cNvPicPr>
+          <p:nvPr>
+            <p:ph sz="quarter" idx="4"/>
+          </p:nvPr>
+        </p:nvPicPr>
+        <p:blipFill>
+          <a:blip r:embed="rId3">
+            <a:extLst>
+              <a:ext uri="{28A0092B-C50C-407E-A947-70E740481C1C}">
+                <a14:useLocalDpi xmlns:a14="http://schemas.microsoft.com/office/drawing/2010/main" val="0"/>
+              </a:ext>
+            </a:extLst>
+          </a:blip>
+          <a:stretch>
+            <a:fillRect/>
+          </a:stretch>
+        </p:blipFill>
+        <p:spPr>
+          <a:xfrm>
+            <a:off x="5291534" y="2716564"/>
+            <a:ext cx="2954056" cy="3508696"/>
+          </a:xfrm>
+        </p:spPr>
+      </p:pic>
+    </p:spTree>
+    <p:extLst>
+      <p:ext uri="{BB962C8B-B14F-4D97-AF65-F5344CB8AC3E}">
+        <p14:creationId xmlns:p14="http://schemas.microsoft.com/office/powerpoint/2010/main" val="876559097"/>
+      </p:ext>
+    </p:extLst>
+  </p:cSld>
+  <p:clrMapOvr>
+    <a:masterClrMapping/>
+  </p:clrMapOvr>
+</p:sld>
+</file>
+
+<file path=ppt/slides/slide7.xml><?xml version="1.0" encoding="utf-8"?>
+<p:sld xmlns:a="http://schemas.openxmlformats.org/drawingml/2006/main" xmlns:r="http://schemas.openxmlformats.org/officeDocument/2006/relationships" xmlns:p="http://schemas.openxmlformats.org/presentationml/2006/main">
+  <p:cSld>
+    <p:spTree>
+      <p:nvGrpSpPr>
+        <p:cNvPr id="1" name=""/>
+        <p:cNvGrpSpPr/>
+        <p:nvPr/>
+      </p:nvGrpSpPr>
+      <p:grpSpPr>
+        <a:xfrm>
+          <a:off x="0" y="0"/>
+          <a:ext cx="0" cy="0"/>
+          <a:chOff x="0" y="0"/>
+          <a:chExt cx="0" cy="0"/>
+        </a:xfrm>
+      </p:grpSpPr>
+      <p:sp>
+        <p:nvSpPr>
+          <p:cNvPr id="2" name="Title 1"/>
+          <p:cNvSpPr>
+            <a:spLocks noGrp="1"/>
+          </p:cNvSpPr>
+          <p:nvPr>
+            <p:ph type="title"/>
+          </p:nvPr>
+        </p:nvSpPr>
+        <p:spPr/>
+        <p:txBody>
+          <a:bodyPr>
+            <a:normAutofit/>
+          </a:bodyPr>
+          <a:lstStyle/>
+          <a:p>
+            <a:r>
+              <a:rPr lang="en-US" dirty="0" smtClean="0"/>
+              <a:t>Login</a:t>
+            </a:r>
+            <a:endParaRPr lang="en-US" dirty="0"/>
+          </a:p>
+        </p:txBody>
+      </p:sp>
+      <p:sp>
+        <p:nvSpPr>
+          <p:cNvPr id="3" name="Text Placeholder 2"/>
+          <p:cNvSpPr>
+            <a:spLocks noGrp="1"/>
+          </p:cNvSpPr>
+          <p:nvPr>
+            <p:ph type="body" idx="1"/>
+          </p:nvPr>
+        </p:nvSpPr>
+        <p:spPr/>
+        <p:txBody>
+          <a:bodyPr/>
+          <a:lstStyle/>
+          <a:p>
+            <a:r>
+              <a:rPr lang="en-US" dirty="0" smtClean="0"/>
+              <a:t>Result</a:t>
+            </a:r>
+            <a:endParaRPr lang="en-US" dirty="0"/>
+          </a:p>
+        </p:txBody>
+      </p:sp>
+      <p:pic>
+        <p:nvPicPr>
+          <p:cNvPr id="7" name="Content Placeholder 6"/>
+          <p:cNvPicPr>
+            <a:picLocks noGrp="1" noChangeAspect="1"/>
+          </p:cNvPicPr>
+          <p:nvPr>
+            <p:ph sz="half" idx="2"/>
+          </p:nvPr>
+        </p:nvPicPr>
+        <p:blipFill>
+          <a:blip r:embed="rId2">
+            <a:extLst>
+              <a:ext uri="{28A0092B-C50C-407E-A947-70E740481C1C}">
+                <a14:useLocalDpi xmlns:a14="http://schemas.microsoft.com/office/drawing/2010/main" val="0"/>
+              </a:ext>
+            </a:extLst>
+          </a:blip>
+          <a:stretch>
+            <a:fillRect/>
+          </a:stretch>
+        </p:blipFill>
+        <p:spPr>
+          <a:xfrm>
+            <a:off x="152923" y="2907921"/>
+            <a:ext cx="4244510" cy="2815898"/>
+          </a:xfrm>
+        </p:spPr>
+      </p:pic>
+      <p:sp>
+        <p:nvSpPr>
+          <p:cNvPr id="5" name="Text Placeholder 4"/>
+          <p:cNvSpPr>
+            <a:spLocks noGrp="1"/>
+          </p:cNvSpPr>
+          <p:nvPr>
+            <p:ph type="body" sz="quarter" idx="3"/>
+          </p:nvPr>
+        </p:nvSpPr>
+        <p:spPr/>
+        <p:txBody>
+          <a:bodyPr/>
+          <a:lstStyle/>
+          <a:p>
+            <a:r>
+              <a:rPr lang="en-US" dirty="0" smtClean="0"/>
+              <a:t>Code</a:t>
+            </a:r>
+            <a:endParaRPr lang="en-US" dirty="0"/>
+          </a:p>
+        </p:txBody>
+      </p:sp>
+      <p:pic>
+        <p:nvPicPr>
+          <p:cNvPr id="8" name="Content Placeholder 7"/>
+          <p:cNvPicPr>
+            <a:picLocks noGrp="1" noChangeAspect="1"/>
+          </p:cNvPicPr>
+          <p:nvPr>
+            <p:ph sz="quarter" idx="4"/>
+          </p:nvPr>
+        </p:nvPicPr>
+        <p:blipFill>
+          <a:blip r:embed="rId3">
+            <a:extLst>
+              <a:ext uri="{28A0092B-C50C-407E-A947-70E740481C1C}">
+                <a14:useLocalDpi xmlns:a14="http://schemas.microsoft.com/office/drawing/2010/main" val="0"/>
+              </a:ext>
+            </a:extLst>
+          </a:blip>
+          <a:srcRect t="15" b="15"/>
+          <a:stretch>
+            <a:fillRect/>
+          </a:stretch>
+        </p:blipFill>
+        <p:spPr>
+          <a:xfrm>
+            <a:off x="4750918" y="3193192"/>
+            <a:ext cx="4082999" cy="2530627"/>
+          </a:xfrm>
+        </p:spPr>
+      </p:pic>
+    </p:spTree>
+    <p:extLst>
+      <p:ext uri="{BB962C8B-B14F-4D97-AF65-F5344CB8AC3E}">
+        <p14:creationId xmlns:p14="http://schemas.microsoft.com/office/powerpoint/2010/main" val="2703990805"/>
+      </p:ext>
+    </p:extLst>
+  </p:cSld>
+  <p:clrMapOvr>
+    <a:masterClrMapping/>
+  </p:clrMapOvr>
+</p:sld>
+</file>
+
+<file path=ppt/slides/slide8.xml><?xml version="1.0" encoding="utf-8"?>
+<p:sld xmlns:a="http://schemas.openxmlformats.org/drawingml/2006/main" xmlns:r="http://schemas.openxmlformats.org/officeDocument/2006/relationships" xmlns:p="http://schemas.openxmlformats.org/presentationml/2006/main">
+  <p:cSld>
+    <p:spTree>
+      <p:nvGrpSpPr>
+        <p:cNvPr id="1" name=""/>
+        <p:cNvGrpSpPr/>
+        <p:nvPr/>
+      </p:nvGrpSpPr>
+      <p:grpSpPr>
+        <a:xfrm>
+          <a:off x="0" y="0"/>
+          <a:ext cx="0" cy="0"/>
+          <a:chOff x="0" y="0"/>
+          <a:chExt cx="0" cy="0"/>
+        </a:xfrm>
+      </p:grpSpPr>
+      <p:sp>
+        <p:nvSpPr>
+          <p:cNvPr id="2" name="Title 1"/>
+          <p:cNvSpPr>
+            <a:spLocks noGrp="1"/>
+          </p:cNvSpPr>
+          <p:nvPr>
+            <p:ph type="title"/>
+          </p:nvPr>
+        </p:nvSpPr>
+        <p:spPr/>
+        <p:txBody>
+          <a:bodyPr>
+            <a:normAutofit/>
+          </a:bodyPr>
+          <a:lstStyle/>
+          <a:p>
+            <a:r>
+              <a:rPr lang="en-US" dirty="0" smtClean="0"/>
+              <a:t>Login with Twitter</a:t>
+            </a:r>
+            <a:endParaRPr lang="en-US" dirty="0"/>
+          </a:p>
+        </p:txBody>
+      </p:sp>
+      <p:sp>
+        <p:nvSpPr>
+          <p:cNvPr id="3" name="Text Placeholder 2"/>
+          <p:cNvSpPr>
+            <a:spLocks noGrp="1"/>
+          </p:cNvSpPr>
+          <p:nvPr>
+            <p:ph type="body" idx="1"/>
+          </p:nvPr>
+        </p:nvSpPr>
+        <p:spPr/>
+        <p:txBody>
+          <a:bodyPr/>
+          <a:lstStyle/>
+          <a:p>
+            <a:r>
+              <a:rPr lang="en-US" dirty="0" smtClean="0"/>
+              <a:t>Result</a:t>
+            </a:r>
+            <a:endParaRPr lang="en-US" dirty="0"/>
+          </a:p>
+        </p:txBody>
+      </p:sp>
+      <p:pic>
+        <p:nvPicPr>
+          <p:cNvPr id="7" name="Content Placeholder 6"/>
+          <p:cNvPicPr>
+            <a:picLocks noGrp="1" noChangeAspect="1"/>
+          </p:cNvPicPr>
+          <p:nvPr>
+            <p:ph sz="half" idx="2"/>
+          </p:nvPr>
+        </p:nvPicPr>
+        <p:blipFill>
+          <a:blip r:embed="rId2">
+            <a:extLst>
+              <a:ext uri="{28A0092B-C50C-407E-A947-70E740481C1C}">
+                <a14:useLocalDpi xmlns:a14="http://schemas.microsoft.com/office/drawing/2010/main" val="0"/>
+              </a:ext>
+            </a:extLst>
+          </a:blip>
+          <a:stretch>
+            <a:fillRect/>
+          </a:stretch>
+        </p:blipFill>
+        <p:spPr>
+          <a:xfrm>
+            <a:off x="379661" y="2435788"/>
+            <a:ext cx="3844370" cy="3620572"/>
+          </a:xfrm>
+        </p:spPr>
+      </p:pic>
+      <p:sp>
+        <p:nvSpPr>
+          <p:cNvPr id="5" name="Text Placeholder 4"/>
+          <p:cNvSpPr>
+            <a:spLocks noGrp="1"/>
+          </p:cNvSpPr>
+          <p:nvPr>
+            <p:ph type="body" sz="quarter" idx="3"/>
+          </p:nvPr>
+        </p:nvSpPr>
+        <p:spPr/>
+        <p:txBody>
+          <a:bodyPr/>
+          <a:lstStyle/>
+          <a:p>
+            <a:r>
+              <a:rPr lang="en-US" dirty="0" smtClean="0"/>
+              <a:t>Code</a:t>
+            </a:r>
+            <a:endParaRPr lang="en-US" dirty="0"/>
+          </a:p>
+        </p:txBody>
+      </p:sp>
+      <p:pic>
+        <p:nvPicPr>
+          <p:cNvPr id="8" name="Content Placeholder 7"/>
+          <p:cNvPicPr>
+            <a:picLocks noGrp="1" noChangeAspect="1"/>
+          </p:cNvPicPr>
+          <p:nvPr>
+            <p:ph sz="quarter" idx="4"/>
+          </p:nvPr>
+        </p:nvPicPr>
+        <p:blipFill>
+          <a:blip r:embed="rId3">
+            <a:extLst>
+              <a:ext uri="{28A0092B-C50C-407E-A947-70E740481C1C}">
+                <a14:useLocalDpi xmlns:a14="http://schemas.microsoft.com/office/drawing/2010/main" val="0"/>
+              </a:ext>
+            </a:extLst>
+          </a:blip>
+          <a:stretch>
+            <a:fillRect/>
+          </a:stretch>
+        </p:blipFill>
+        <p:spPr>
+          <a:xfrm>
+            <a:off x="4877413" y="2523425"/>
+            <a:ext cx="3441797" cy="3530211"/>
+          </a:xfrm>
+        </p:spPr>
+      </p:pic>
+    </p:spTree>
+    <p:extLst>
+      <p:ext uri="{BB962C8B-B14F-4D97-AF65-F5344CB8AC3E}">
+        <p14:creationId xmlns:p14="http://schemas.microsoft.com/office/powerpoint/2010/main" val="2729747789"/>
+      </p:ext>
+    </p:extLst>
+  </p:cSld>
+  <p:clrMapOvr>
+    <a:masterClrMapping/>
+  </p:clrMapOvr>
+</p:sld>
+</file>
+
+<file path=ppt/slides/slide9.xml><?xml version="1.0" encoding="utf-8"?>
+<p:sld xmlns:a="http://schemas.openxmlformats.org/drawingml/2006/main" xmlns:r="http://schemas.openxmlformats.org/officeDocument/2006/relationships" xmlns:p="http://schemas.openxmlformats.org/presentationml/2006/main">
+  <p:cSld>
+    <p:spTree>
+      <p:nvGrpSpPr>
+        <p:cNvPr id="1" name=""/>
+        <p:cNvGrpSpPr/>
+        <p:nvPr/>
+      </p:nvGrpSpPr>
+      <p:grpSpPr>
+        <a:xfrm>
+          <a:off x="0" y="0"/>
+          <a:ext cx="0" cy="0"/>
+          <a:chOff x="0" y="0"/>
+          <a:chExt cx="0" cy="0"/>
+        </a:xfrm>
+      </p:grpSpPr>
+      <p:sp>
+        <p:nvSpPr>
+          <p:cNvPr id="2" name="Title 1"/>
+          <p:cNvSpPr>
+            <a:spLocks noGrp="1"/>
+          </p:cNvSpPr>
+          <p:nvPr>
+            <p:ph type="title"/>
+          </p:nvPr>
+        </p:nvSpPr>
+        <p:spPr/>
+        <p:txBody>
+          <a:bodyPr/>
+          <a:lstStyle/>
+          <a:p>
+            <a:r>
+              <a:rPr lang="en-US" dirty="0" err="1" smtClean="0"/>
+              <a:t>Github</a:t>
+            </a:r>
+            <a:endParaRPr lang="en-US" dirty="0"/>
+          </a:p>
+        </p:txBody>
+      </p:sp>
+      <p:pic>
+        <p:nvPicPr>
+          <p:cNvPr id="5" name="Content Placeholder 4"/>
+          <p:cNvPicPr>
+            <a:picLocks noGrp="1" noChangeAspect="1"/>
+          </p:cNvPicPr>
+          <p:nvPr>
+            <p:ph idx="1"/>
+          </p:nvPr>
+        </p:nvPicPr>
+        <p:blipFill>
+          <a:blip r:embed="rId2">
+            <a:extLst>
+              <a:ext uri="{28A0092B-C50C-407E-A947-70E740481C1C}">
+                <a14:useLocalDpi xmlns:a14="http://schemas.microsoft.com/office/drawing/2010/main" val="0"/>
+              </a:ext>
+            </a:extLst>
+          </a:blip>
+          <a:stretch>
+            <a:fillRect/>
+          </a:stretch>
+        </p:blipFill>
+        <p:spPr>
+          <a:xfrm>
+            <a:off x="3335846" y="1028591"/>
+            <a:ext cx="4986907" cy="5104818"/>
+          </a:xfrm>
+        </p:spPr>
+      </p:pic>
+      <p:sp>
+        <p:nvSpPr>
+          <p:cNvPr id="4" name="Text Placeholder 3"/>
+          <p:cNvSpPr>
+            <a:spLocks noGrp="1"/>
+          </p:cNvSpPr>
+          <p:nvPr>
+            <p:ph type="body" sz="half" idx="2"/>
+          </p:nvPr>
+        </p:nvSpPr>
+        <p:spPr/>
+        <p:txBody>
+          <a:bodyPr/>
+          <a:lstStyle/>
+          <a:p>
+            <a:r>
+              <a:rPr lang="en-US" dirty="0" smtClean="0"/>
+              <a:t>Homepage</a:t>
+            </a:r>
+            <a:endParaRPr lang="en-US" dirty="0"/>
+          </a:p>
+        </p:txBody>
+      </p:sp>
+    </p:spTree>
+    <p:extLst>
+      <p:ext uri="{BB962C8B-B14F-4D97-AF65-F5344CB8AC3E}">
+        <p14:creationId xmlns:p14="http://schemas.microsoft.com/office/powerpoint/2010/main" val="2844281325"/>
       </p:ext>
     </p:extLst>
   </p:cSld>

</xml_diff>